<commit_message>
group theory-based ccyclic pool choices for the nonadaptive approach
</commit_message>
<xml_diff>
--- a/Presentation1.pptx
+++ b/Presentation1.pptx
@@ -19,12 +19,12 @@
     <p:sldId id="257" r:id="rId8"/>
     <p:sldId id="266" r:id="rId9"/>
     <p:sldId id="273" r:id="rId10"/>
-    <p:sldId id="268" r:id="rId11"/>
-    <p:sldId id="269" r:id="rId12"/>
-    <p:sldId id="277" r:id="rId13"/>
-    <p:sldId id="276" r:id="rId14"/>
-    <p:sldId id="279" r:id="rId15"/>
-    <p:sldId id="278" r:id="rId16"/>
+    <p:sldId id="280" r:id="rId11"/>
+    <p:sldId id="268" r:id="rId12"/>
+    <p:sldId id="269" r:id="rId13"/>
+    <p:sldId id="277" r:id="rId14"/>
+    <p:sldId id="276" r:id="rId15"/>
+    <p:sldId id="279" r:id="rId16"/>
   </p:sldIdLst>
   <p:sldSz cx="12192000" cy="6858000"/>
   <p:notesSz cx="7103745" cy="10234295"/>
@@ -3586,7 +3586,7 @@
       <p:grpSpPr/>
       <p:pic>
         <p:nvPicPr>
-          <p:cNvPr id="2" name="Picture 1"/>
+          <p:cNvPr id="10" name="Picture 9"/>
           <p:cNvPicPr>
             <a:picLocks noChangeAspect="1"/>
           </p:cNvPicPr>
@@ -3600,8 +3600,8 @@
         </p:blipFill>
         <p:spPr>
           <a:xfrm>
-            <a:off x="671195" y="1228725"/>
-            <a:ext cx="5648325" cy="5505450"/>
+            <a:off x="1514475" y="2829560"/>
+            <a:ext cx="3504565" cy="3467735"/>
           </a:xfrm>
           <a:prstGeom prst="rect">
             <a:avLst/>
@@ -3610,7 +3610,7 @@
       </p:pic>
       <p:pic>
         <p:nvPicPr>
-          <p:cNvPr id="3" name="Picture 2"/>
+          <p:cNvPr id="11" name="Picture 10"/>
           <p:cNvPicPr>
             <a:picLocks noChangeAspect="1"/>
           </p:cNvPicPr>
@@ -3624,8 +3624,98 @@
         </p:blipFill>
         <p:spPr>
           <a:xfrm>
-            <a:off x="671195" y="266700"/>
-            <a:ext cx="8296275" cy="771525"/>
+            <a:off x="5184140" y="285750"/>
+            <a:ext cx="2835910" cy="6011545"/>
+          </a:xfrm>
+          <a:prstGeom prst="rect">
+            <a:avLst/>
+          </a:prstGeom>
+        </p:spPr>
+      </p:pic>
+      <p:cxnSp>
+        <p:nvCxnSpPr>
+          <p:cNvPr id="12" name="Straight Arrow Connector 11"/>
+          <p:cNvCxnSpPr/>
+          <p:nvPr/>
+        </p:nvCxnSpPr>
+        <p:spPr>
+          <a:xfrm flipH="1">
+            <a:off x="8020050" y="2139950"/>
+            <a:ext cx="533400" cy="0"/>
+          </a:xfrm>
+          <a:prstGeom prst="straightConnector1">
+            <a:avLst/>
+          </a:prstGeom>
+          <a:ln>
+            <a:tailEnd type="arrow"/>
+          </a:ln>
+        </p:spPr>
+        <p:style>
+          <a:lnRef idx="1">
+            <a:schemeClr val="accent1"/>
+          </a:lnRef>
+          <a:fillRef idx="0">
+            <a:schemeClr val="accent1"/>
+          </a:fillRef>
+          <a:effectRef idx="0">
+            <a:schemeClr val="accent1"/>
+          </a:effectRef>
+          <a:fontRef idx="minor">
+            <a:schemeClr val="tx1"/>
+          </a:fontRef>
+        </p:style>
+      </p:cxnSp>
+      <p:cxnSp>
+        <p:nvCxnSpPr>
+          <p:cNvPr id="13" name="Straight Arrow Connector 12"/>
+          <p:cNvCxnSpPr/>
+          <p:nvPr/>
+        </p:nvCxnSpPr>
+        <p:spPr>
+          <a:xfrm flipH="1">
+            <a:off x="8020050" y="3054350"/>
+            <a:ext cx="533400" cy="0"/>
+          </a:xfrm>
+          <a:prstGeom prst="straightConnector1">
+            <a:avLst/>
+          </a:prstGeom>
+          <a:ln>
+            <a:tailEnd type="arrow"/>
+          </a:ln>
+        </p:spPr>
+        <p:style>
+          <a:lnRef idx="1">
+            <a:schemeClr val="accent1"/>
+          </a:lnRef>
+          <a:fillRef idx="0">
+            <a:schemeClr val="accent1"/>
+          </a:fillRef>
+          <a:effectRef idx="0">
+            <a:schemeClr val="accent1"/>
+          </a:effectRef>
+          <a:fontRef idx="minor">
+            <a:schemeClr val="tx1"/>
+          </a:fontRef>
+        </p:style>
+      </p:cxnSp>
+      <p:pic>
+        <p:nvPicPr>
+          <p:cNvPr id="15" name="Picture 14"/>
+          <p:cNvPicPr>
+            <a:picLocks noChangeAspect="1"/>
+          </p:cNvPicPr>
+          <p:nvPr/>
+        </p:nvPicPr>
+        <p:blipFill>
+          <a:blip r:embed="rId3"/>
+          <a:stretch>
+            <a:fillRect/>
+          </a:stretch>
+        </p:blipFill>
+        <p:spPr>
+          <a:xfrm>
+            <a:off x="953135" y="1071245"/>
+            <a:ext cx="4065905" cy="1487170"/>
           </a:xfrm>
           <a:prstGeom prst="rect">
             <a:avLst/>
@@ -3652,7 +3742,7 @@
       <p:grpSpPr/>
       <p:pic>
         <p:nvPicPr>
-          <p:cNvPr id="9" name="Picture 8"/>
+          <p:cNvPr id="2" name="Picture 1"/>
           <p:cNvPicPr>
             <a:picLocks noChangeAspect="1"/>
           </p:cNvPicPr>
@@ -3666,6 +3756,72 @@
         </p:blipFill>
         <p:spPr>
           <a:xfrm>
+            <a:off x="671195" y="1228725"/>
+            <a:ext cx="5648325" cy="5505450"/>
+          </a:xfrm>
+          <a:prstGeom prst="rect">
+            <a:avLst/>
+          </a:prstGeom>
+        </p:spPr>
+      </p:pic>
+      <p:pic>
+        <p:nvPicPr>
+          <p:cNvPr id="3" name="Picture 2"/>
+          <p:cNvPicPr>
+            <a:picLocks noChangeAspect="1"/>
+          </p:cNvPicPr>
+          <p:nvPr/>
+        </p:nvPicPr>
+        <p:blipFill>
+          <a:blip r:embed="rId2"/>
+          <a:stretch>
+            <a:fillRect/>
+          </a:stretch>
+        </p:blipFill>
+        <p:spPr>
+          <a:xfrm>
+            <a:off x="671195" y="266700"/>
+            <a:ext cx="8296275" cy="771525"/>
+          </a:xfrm>
+          <a:prstGeom prst="rect">
+            <a:avLst/>
+          </a:prstGeom>
+        </p:spPr>
+      </p:pic>
+    </p:spTree>
+  </p:cSld>
+  <p:clrMapOvr>
+    <a:masterClrMapping/>
+  </p:clrMapOvr>
+</p:sld>
+</file>
+
+<file path=ppt/slides/slide12.xml><?xml version="1.0" encoding="utf-8"?>
+<p:sld xmlns:a="http://schemas.openxmlformats.org/drawingml/2006/main" xmlns:r="http://schemas.openxmlformats.org/officeDocument/2006/relationships" xmlns:p="http://schemas.openxmlformats.org/presentationml/2006/main">
+  <p:cSld>
+    <p:spTree>
+      <p:nvGrpSpPr>
+        <p:cNvPr id="1" name=""/>
+        <p:cNvGrpSpPr/>
+        <p:nvPr/>
+      </p:nvGrpSpPr>
+      <p:grpSpPr/>
+      <p:pic>
+        <p:nvPicPr>
+          <p:cNvPr id="9" name="Picture 8"/>
+          <p:cNvPicPr>
+            <a:picLocks noChangeAspect="1"/>
+          </p:cNvPicPr>
+          <p:nvPr/>
+        </p:nvPicPr>
+        <p:blipFill>
+          <a:blip r:embed="rId1"/>
+          <a:stretch>
+            <a:fillRect/>
+          </a:stretch>
+        </p:blipFill>
+        <p:spPr>
+          <a:xfrm>
             <a:off x="71755" y="649605"/>
             <a:ext cx="3592195" cy="3803015"/>
           </a:xfrm>
@@ -3744,20 +3900,8 @@
           </a:bodyPr>
           <a:p>
             <a:r>
-              <a:rPr lang="" altLang="en-US" b="1"/>
-              <a:t>minimal </a:t>
-            </a:r>
-            <a:r>
               <a:rPr lang="en-US" altLang="en-US" b="1"/>
-              <a:t>~</a:t>
-            </a:r>
-            <a:r>
-              <a:rPr lang="" altLang="en-US" b="1"/>
-              <a:t>1</a:t>
-            </a:r>
-            <a:r>
-              <a:rPr lang="en-US" altLang="en-US" b="1"/>
-              <a:t>x coverage, 5000 samples per plate</a:t>
+              <a:t>minimal ~1x coverage, 5000 samples per plate</a:t>
             </a:r>
             <a:endParaRPr lang="en-US" altLang="en-US" b="1"/>
           </a:p>
@@ -4125,7 +4269,7 @@
         </p:blipFill>
         <p:spPr>
           <a:xfrm>
-            <a:off x="7506970" y="3429000"/>
+            <a:off x="7506970" y="3368675"/>
             <a:ext cx="3675380" cy="3065780"/>
           </a:xfrm>
           <a:prstGeom prst="rect">
@@ -4141,7 +4285,7 @@
 </p:sld>
 </file>
 
-<file path=ppt/slides/slide12.xml><?xml version="1.0" encoding="utf-8"?>
+<file path=ppt/slides/slide13.xml><?xml version="1.0" encoding="utf-8"?>
 <p:sld xmlns:a="http://schemas.openxmlformats.org/drawingml/2006/main" xmlns:r="http://schemas.openxmlformats.org/officeDocument/2006/relationships" xmlns:p="http://schemas.openxmlformats.org/presentationml/2006/main">
   <p:cSld>
     <p:spTree>
@@ -4245,20 +4389,8 @@
           </a:bodyPr>
           <a:p>
             <a:r>
-              <a:rPr lang="" altLang="en-US" b="1"/>
-              <a:t>modest </a:t>
-            </a:r>
-            <a:r>
               <a:rPr lang="en-US" altLang="en-US" b="1"/>
-              <a:t>~</a:t>
-            </a:r>
-            <a:r>
-              <a:rPr lang="" altLang="en-US" b="1"/>
-              <a:t>2</a:t>
-            </a:r>
-            <a:r>
-              <a:rPr lang="en-US" altLang="en-US" b="1"/>
-              <a:t>x coverage, 5000 samples per plate</a:t>
+              <a:t>modest ~2x coverage, 5000 samples per plate</a:t>
             </a:r>
             <a:endParaRPr lang="en-US" altLang="en-US" b="1"/>
           </a:p>
@@ -4579,7 +4711,7 @@
         </p:blipFill>
         <p:spPr>
           <a:xfrm>
-            <a:off x="7887335" y="3623945"/>
+            <a:off x="7887335" y="3623310"/>
             <a:ext cx="3584575" cy="2898775"/>
           </a:xfrm>
           <a:prstGeom prst="rect">
@@ -4595,7 +4727,7 @@
 </p:sld>
 </file>
 
-<file path=ppt/slides/slide13.xml><?xml version="1.0" encoding="utf-8"?>
+<file path=ppt/slides/slide14.xml><?xml version="1.0" encoding="utf-8"?>
 <p:sld xmlns:a="http://schemas.openxmlformats.org/drawingml/2006/main" xmlns:r="http://schemas.openxmlformats.org/officeDocument/2006/relationships" xmlns:p="http://schemas.openxmlformats.org/presentationml/2006/main">
   <p:cSld>
     <p:spTree>
@@ -4700,15 +4832,7 @@
           <a:p>
             <a:r>
               <a:rPr lang="en-US" altLang="en-US" b="1"/>
-              <a:t>modest ~</a:t>
-            </a:r>
-            <a:r>
-              <a:rPr lang="" altLang="en-US" b="1"/>
-              <a:t>5</a:t>
-            </a:r>
-            <a:r>
-              <a:rPr lang="en-US" altLang="en-US" b="1"/>
-              <a:t>x coverage, 5000 samples per plate</a:t>
+              <a:t>modest ~5x coverage, 5000 samples per plate</a:t>
             </a:r>
             <a:endParaRPr lang="en-US" altLang="en-US" b="1"/>
           </a:p>
@@ -4931,14 +5055,14 @@
           <a:p>
             <a:r>
               <a:rPr lang="en-US" sz="700"/>
-              <a:t>false pos/ neg sample 0.17826895269572401</a:t>
+              <a:t>false pos/ neg sample 0.2371410865523652</a:t>
             </a:r>
             <a:endParaRPr lang="en-US" sz="700"/>
           </a:p>
           <a:p>
             <a:r>
               <a:rPr lang="en-US" sz="700"/>
-              <a:t>false neg/pos sample 0.1694915254237288</a:t>
+              <a:t>false neg/pos sample 0.05084745762711865</a:t>
             </a:r>
             <a:endParaRPr lang="en-US" sz="700"/>
           </a:p>
@@ -4952,14 +5076,14 @@
           <a:p>
             <a:r>
               <a:rPr lang="en-US" sz="700"/>
-              <a:t>coverage (redundancy):  pools*size / samples:  2.1942857142857144 x</a:t>
+              <a:t>coverage (redundancy):  pools*size / samples:  5.485714285714286 x</a:t>
             </a:r>
             <a:endParaRPr lang="en-US" sz="700"/>
           </a:p>
           <a:p>
             <a:r>
               <a:rPr lang="en-US" sz="700"/>
-              <a:t>correctly identified rate 0.8218367346938775 correct results/sample</a:t>
+              <a:t>correctly identified rate 0.7651020408163265 correct results/sample</a:t>
             </a:r>
             <a:endParaRPr lang="en-US" sz="700"/>
           </a:p>
@@ -5046,14 +5170,15 @@
         </p:nvPicPr>
         <p:blipFill>
           <a:blip r:embed="rId6"/>
+          <a:srcRect/>
           <a:stretch>
             <a:fillRect/>
           </a:stretch>
         </p:blipFill>
         <p:spPr>
           <a:xfrm>
-            <a:off x="3841115" y="3356610"/>
-            <a:ext cx="3561715" cy="3432175"/>
+            <a:off x="3896995" y="3693160"/>
+            <a:ext cx="3145790" cy="3032125"/>
           </a:xfrm>
           <a:prstGeom prst="rect">
             <a:avLst/>
@@ -5078,507 +5203,6 @@
           <a:xfrm>
             <a:off x="7579360" y="3402965"/>
             <a:ext cx="3855085" cy="3260090"/>
-          </a:xfrm>
-          <a:prstGeom prst="rect">
-            <a:avLst/>
-          </a:prstGeom>
-        </p:spPr>
-      </p:pic>
-    </p:spTree>
-  </p:cSld>
-  <p:clrMapOvr>
-    <a:masterClrMapping/>
-  </p:clrMapOvr>
-</p:sld>
-</file>
-
-<file path=ppt/slides/slide14.xml><?xml version="1.0" encoding="utf-8"?>
-<p:sld xmlns:a="http://schemas.openxmlformats.org/drawingml/2006/main" xmlns:r="http://schemas.openxmlformats.org/officeDocument/2006/relationships" xmlns:p="http://schemas.openxmlformats.org/presentationml/2006/main">
-  <p:cSld>
-    <p:spTree>
-      <p:nvGrpSpPr>
-        <p:cNvPr id="1" name=""/>
-        <p:cNvGrpSpPr/>
-        <p:nvPr/>
-      </p:nvGrpSpPr>
-      <p:grpSpPr/>
-      <p:pic>
-        <p:nvPicPr>
-          <p:cNvPr id="9" name="Picture 8"/>
-          <p:cNvPicPr>
-            <a:picLocks noChangeAspect="1"/>
-          </p:cNvPicPr>
-          <p:nvPr/>
-        </p:nvPicPr>
-        <p:blipFill>
-          <a:blip r:embed="rId1"/>
-          <a:stretch>
-            <a:fillRect/>
-          </a:stretch>
-        </p:blipFill>
-        <p:spPr>
-          <a:xfrm>
-            <a:off x="71755" y="649605"/>
-            <a:ext cx="3592195" cy="3803015"/>
-          </a:xfrm>
-          <a:prstGeom prst="rect">
-            <a:avLst/>
-          </a:prstGeom>
-        </p:spPr>
-      </p:pic>
-      <p:pic>
-        <p:nvPicPr>
-          <p:cNvPr id="10" name="Picture 9"/>
-          <p:cNvPicPr>
-            <a:picLocks noChangeAspect="1"/>
-          </p:cNvPicPr>
-          <p:nvPr/>
-        </p:nvPicPr>
-        <p:blipFill>
-          <a:blip r:embed="rId2"/>
-          <a:stretch>
-            <a:fillRect/>
-          </a:stretch>
-        </p:blipFill>
-        <p:spPr>
-          <a:xfrm>
-            <a:off x="619125" y="4606290"/>
-            <a:ext cx="2951480" cy="2240915"/>
-          </a:xfrm>
-          <a:prstGeom prst="rect">
-            <a:avLst/>
-          </a:prstGeom>
-        </p:spPr>
-      </p:pic>
-      <p:pic>
-        <p:nvPicPr>
-          <p:cNvPr id="11" name="Picture 10"/>
-          <p:cNvPicPr>
-            <a:picLocks noChangeAspect="1"/>
-          </p:cNvPicPr>
-          <p:nvPr/>
-        </p:nvPicPr>
-        <p:blipFill>
-          <a:blip r:embed="rId3"/>
-          <a:stretch>
-            <a:fillRect/>
-          </a:stretch>
-        </p:blipFill>
-        <p:spPr>
-          <a:xfrm>
-            <a:off x="4283710" y="659765"/>
-            <a:ext cx="3223260" cy="1681480"/>
-          </a:xfrm>
-          <a:prstGeom prst="rect">
-            <a:avLst/>
-          </a:prstGeom>
-        </p:spPr>
-      </p:pic>
-      <p:sp>
-        <p:nvSpPr>
-          <p:cNvPr id="14" name="Text Box 13"/>
-          <p:cNvSpPr txBox="1"/>
-          <p:nvPr/>
-        </p:nvSpPr>
-        <p:spPr>
-          <a:xfrm>
-            <a:off x="2823210" y="28575"/>
-            <a:ext cx="7515860" cy="368300"/>
-          </a:xfrm>
-          <a:prstGeom prst="rect">
-            <a:avLst/>
-          </a:prstGeom>
-          <a:noFill/>
-        </p:spPr>
-        <p:txBody>
-          <a:bodyPr wrap="square" rtlCol="0">
-            <a:spAutoFit/>
-          </a:bodyPr>
-          <a:p>
-            <a:r>
-              <a:rPr lang="" altLang="en-US" b="1"/>
-              <a:t>high </a:t>
-            </a:r>
-            <a:r>
-              <a:rPr lang="en-US" altLang="en-US" b="1"/>
-              <a:t>~</a:t>
-            </a:r>
-            <a:r>
-              <a:rPr lang="" altLang="en-US" b="1"/>
-              <a:t>10</a:t>
-            </a:r>
-            <a:r>
-              <a:rPr lang="en-US" altLang="en-US" b="1"/>
-              <a:t>x coverage, 5000 samples per plate</a:t>
-            </a:r>
-            <a:endParaRPr lang="en-US" altLang="en-US" b="1"/>
-          </a:p>
-        </p:txBody>
-      </p:sp>
-      <p:cxnSp>
-        <p:nvCxnSpPr>
-          <p:cNvPr id="16" name="Straight Arrow Connector 15"/>
-          <p:cNvCxnSpPr/>
-          <p:nvPr/>
-        </p:nvCxnSpPr>
-        <p:spPr>
-          <a:xfrm flipH="1">
-            <a:off x="3185795" y="5073015"/>
-            <a:ext cx="384810" cy="0"/>
-          </a:xfrm>
-          <a:prstGeom prst="straightConnector1">
-            <a:avLst/>
-          </a:prstGeom>
-          <a:ln>
-            <a:solidFill>
-              <a:srgbClr val="FF0000"/>
-            </a:solidFill>
-            <a:tailEnd type="arrow" w="med" len="med"/>
-          </a:ln>
-        </p:spPr>
-        <p:style>
-          <a:lnRef idx="1">
-            <a:schemeClr val="accent2"/>
-          </a:lnRef>
-          <a:fillRef idx="0">
-            <a:schemeClr val="accent2"/>
-          </a:fillRef>
-          <a:effectRef idx="0">
-            <a:schemeClr val="accent2"/>
-          </a:effectRef>
-          <a:fontRef idx="minor">
-            <a:schemeClr val="tx1"/>
-          </a:fontRef>
-        </p:style>
-      </p:cxnSp>
-      <p:pic>
-        <p:nvPicPr>
-          <p:cNvPr id="20" name="Picture 19"/>
-          <p:cNvPicPr>
-            <a:picLocks noChangeAspect="1"/>
-          </p:cNvPicPr>
-          <p:nvPr/>
-        </p:nvPicPr>
-        <p:blipFill>
-          <a:blip r:embed="rId4"/>
-          <a:stretch>
-            <a:fillRect/>
-          </a:stretch>
-        </p:blipFill>
-        <p:spPr>
-          <a:xfrm>
-            <a:off x="7887335" y="519430"/>
-            <a:ext cx="3858260" cy="130175"/>
-          </a:xfrm>
-          <a:prstGeom prst="rect">
-            <a:avLst/>
-          </a:prstGeom>
-        </p:spPr>
-      </p:pic>
-      <p:grpSp>
-        <p:nvGrpSpPr>
-          <p:cNvPr id="25" name="Group 24"/>
-          <p:cNvGrpSpPr/>
-          <p:nvPr/>
-        </p:nvGrpSpPr>
-        <p:grpSpPr>
-          <a:xfrm>
-            <a:off x="8756015" y="791210"/>
-            <a:ext cx="2527300" cy="1748221"/>
-            <a:chOff x="12721" y="1150"/>
-            <a:chExt cx="5283" cy="3655"/>
-          </a:xfrm>
-        </p:grpSpPr>
-        <p:pic>
-          <p:nvPicPr>
-            <p:cNvPr id="21" name="Picture 20"/>
-            <p:cNvPicPr>
-              <a:picLocks noChangeAspect="1"/>
-            </p:cNvPicPr>
-            <p:nvPr/>
-          </p:nvPicPr>
-          <p:blipFill>
-            <a:blip r:embed="rId5"/>
-            <a:stretch>
-              <a:fillRect/>
-            </a:stretch>
-          </p:blipFill>
-          <p:spPr>
-            <a:xfrm>
-              <a:off x="12721" y="1150"/>
-              <a:ext cx="5003" cy="3642"/>
-            </a:xfrm>
-            <a:prstGeom prst="rect">
-              <a:avLst/>
-            </a:prstGeom>
-          </p:spPr>
-        </p:pic>
-        <p:sp>
-          <p:nvSpPr>
-            <p:cNvPr id="22" name="Text Box 21"/>
-            <p:cNvSpPr txBox="1"/>
-            <p:nvPr/>
-          </p:nvSpPr>
-          <p:spPr>
-            <a:xfrm>
-              <a:off x="15496" y="4353"/>
-              <a:ext cx="2508" cy="447"/>
-            </a:xfrm>
-            <a:prstGeom prst="rect">
-              <a:avLst/>
-            </a:prstGeom>
-            <a:noFill/>
-          </p:spPr>
-          <p:txBody>
-            <a:bodyPr wrap="square" rtlCol="0">
-              <a:spAutoFit/>
-            </a:bodyPr>
-            <a:p>
-              <a:r>
-                <a:rPr lang="en-US" altLang="en-US" sz="800"/>
-                <a:t>positive pools</a:t>
-              </a:r>
-              <a:endParaRPr lang="en-US" altLang="en-US" sz="800"/>
-            </a:p>
-          </p:txBody>
-        </p:sp>
-        <p:sp>
-          <p:nvSpPr>
-            <p:cNvPr id="23" name="Text Box 22"/>
-            <p:cNvSpPr txBox="1"/>
-            <p:nvPr/>
-          </p:nvSpPr>
-          <p:spPr>
-            <a:xfrm>
-              <a:off x="12721" y="4358"/>
-              <a:ext cx="2126" cy="447"/>
-            </a:xfrm>
-            <a:prstGeom prst="rect">
-              <a:avLst/>
-            </a:prstGeom>
-            <a:noFill/>
-          </p:spPr>
-          <p:txBody>
-            <a:bodyPr wrap="square" rtlCol="0">
-              <a:spAutoFit/>
-            </a:bodyPr>
-            <a:p>
-              <a:r>
-                <a:rPr lang="en-US" altLang="en-US" sz="800"/>
-                <a:t>negative pools</a:t>
-              </a:r>
-              <a:endParaRPr lang="en-US" altLang="en-US" sz="800"/>
-            </a:p>
-          </p:txBody>
-        </p:sp>
-        <p:sp>
-          <p:nvSpPr>
-            <p:cNvPr id="24" name="Text Box 23"/>
-            <p:cNvSpPr txBox="1"/>
-            <p:nvPr/>
-          </p:nvSpPr>
-          <p:spPr>
-            <a:xfrm>
-              <a:off x="15216" y="1263"/>
-              <a:ext cx="2508" cy="416"/>
-            </a:xfrm>
-            <a:prstGeom prst="rect">
-              <a:avLst/>
-            </a:prstGeom>
-            <a:noFill/>
-          </p:spPr>
-          <p:txBody>
-            <a:bodyPr wrap="square" rtlCol="0">
-              <a:spAutoFit/>
-            </a:bodyPr>
-            <a:p>
-              <a:r>
-                <a:rPr lang="en-US" altLang="en-US" sz="700">
-                  <a:solidFill>
-                    <a:srgbClr val="FF0000"/>
-                  </a:solidFill>
-                </a:rPr>
-                <a:t>positive samples</a:t>
-              </a:r>
-              <a:endParaRPr lang="en-US" altLang="en-US" sz="700">
-                <a:solidFill>
-                  <a:srgbClr val="FF0000"/>
-                </a:solidFill>
-              </a:endParaRPr>
-            </a:p>
-          </p:txBody>
-        </p:sp>
-      </p:grpSp>
-      <p:sp>
-        <p:nvSpPr>
-          <p:cNvPr id="5" name="Text Box 4"/>
-          <p:cNvSpPr txBox="1"/>
-          <p:nvPr/>
-        </p:nvSpPr>
-        <p:spPr>
-          <a:xfrm>
-            <a:off x="7994650" y="2682875"/>
-            <a:ext cx="3750310" cy="629920"/>
-          </a:xfrm>
-          <a:prstGeom prst="rect">
-            <a:avLst/>
-          </a:prstGeom>
-          <a:noFill/>
-        </p:spPr>
-        <p:txBody>
-          <a:bodyPr wrap="square" rtlCol="0" anchor="t">
-            <a:spAutoFit/>
-          </a:bodyPr>
-          <a:p>
-            <a:r>
-              <a:rPr lang="en-US" sz="700"/>
-              <a:t>false pos/ neg sample 0.20698202850650693</a:t>
-            </a:r>
-            <a:endParaRPr lang="en-US" sz="700"/>
-          </a:p>
-          <a:p>
-            <a:r>
-              <a:rPr lang="en-US" sz="700"/>
-              <a:t>false neg/pos sample 0.1016949152542373</a:t>
-            </a:r>
-            <a:endParaRPr lang="en-US" sz="700"/>
-          </a:p>
-          <a:p>
-            <a:r>
-              <a:rPr lang="en-US" sz="700"/>
-              <a:t>fold efficiency:  12.760416666666666 samples/test</a:t>
-            </a:r>
-            <a:endParaRPr lang="en-US" sz="700"/>
-          </a:p>
-          <a:p>
-            <a:r>
-              <a:rPr lang="en-US" sz="700"/>
-              <a:t>coverage (redundancy):  pools*size / samples:  1.0971428571428572 x</a:t>
-            </a:r>
-            <a:endParaRPr lang="en-US" sz="700"/>
-          </a:p>
-          <a:p>
-            <a:r>
-              <a:rPr lang="en-US" sz="700"/>
-              <a:t>correctly identified rate 0.7942857142857143 correct results/sample</a:t>
-            </a:r>
-            <a:endParaRPr lang="en-US" sz="700"/>
-          </a:p>
-        </p:txBody>
-      </p:sp>
-      <p:sp>
-        <p:nvSpPr>
-          <p:cNvPr id="4" name="Text Box 3"/>
-          <p:cNvSpPr txBox="1"/>
-          <p:nvPr/>
-        </p:nvSpPr>
-        <p:spPr>
-          <a:xfrm>
-            <a:off x="3912870" y="2323465"/>
-            <a:ext cx="3974465" cy="953135"/>
-          </a:xfrm>
-          <a:prstGeom prst="rect">
-            <a:avLst/>
-          </a:prstGeom>
-          <a:noFill/>
-        </p:spPr>
-        <p:txBody>
-          <a:bodyPr wrap="square" rtlCol="0" anchor="t">
-            <a:spAutoFit/>
-          </a:bodyPr>
-          <a:p>
-            <a:r>
-              <a:rPr lang="en-US" sz="700"/>
-              <a:t>minimum pool size for non-overlapping but complete sample coverage 12.760416666666666</a:t>
-            </a:r>
-            <a:endParaRPr lang="en-US" sz="700"/>
-          </a:p>
-          <a:p>
-            <a:r>
-              <a:rPr lang="en-US" sz="700"/>
-              <a:t>target size:  130</a:t>
-            </a:r>
-            <a:endParaRPr lang="en-US" sz="700"/>
-          </a:p>
-          <a:p>
-            <a:r>
-              <a:rPr lang="en-US" sz="700"/>
-              <a:t>final pool size considering even division of chapters  140</a:t>
-            </a:r>
-            <a:endParaRPr lang="en-US" sz="700"/>
-          </a:p>
-          <a:p>
-            <a:r>
-              <a:rPr lang="en-US" sz="700"/>
-              <a:t>first chapter of pools:  35</a:t>
-            </a:r>
-            <a:endParaRPr lang="en-US" sz="700"/>
-          </a:p>
-          <a:p>
-            <a:r>
-              <a:rPr lang="en-US" sz="700"/>
-              <a:t>number of pools:  384</a:t>
-            </a:r>
-            <a:endParaRPr lang="en-US" sz="700"/>
-          </a:p>
-          <a:p>
-            <a:r>
-              <a:rPr lang="en-US" sz="700"/>
-              <a:t>pool size: 140</a:t>
-            </a:r>
-            <a:endParaRPr lang="en-US" sz="700"/>
-          </a:p>
-          <a:p>
-            <a:r>
-              <a:rPr lang="en-US" sz="700"/>
-              <a:t>dilution-dependent false negative rate 0.11985058256974526</a:t>
-            </a:r>
-            <a:endParaRPr lang="en-US" sz="700"/>
-          </a:p>
-        </p:txBody>
-      </p:sp>
-      <p:pic>
-        <p:nvPicPr>
-          <p:cNvPr id="2" name="Picture 1"/>
-          <p:cNvPicPr>
-            <a:picLocks noChangeAspect="1"/>
-          </p:cNvPicPr>
-          <p:nvPr/>
-        </p:nvPicPr>
-        <p:blipFill>
-          <a:blip r:embed="rId6"/>
-          <a:stretch>
-            <a:fillRect/>
-          </a:stretch>
-        </p:blipFill>
-        <p:spPr>
-          <a:xfrm>
-            <a:off x="3742690" y="3258820"/>
-            <a:ext cx="3764280" cy="3628390"/>
-          </a:xfrm>
-          <a:prstGeom prst="rect">
-            <a:avLst/>
-          </a:prstGeom>
-        </p:spPr>
-      </p:pic>
-      <p:pic>
-        <p:nvPicPr>
-          <p:cNvPr id="3" name="Picture 2"/>
-          <p:cNvPicPr>
-            <a:picLocks noChangeAspect="1"/>
-          </p:cNvPicPr>
-          <p:nvPr/>
-        </p:nvPicPr>
-        <p:blipFill>
-          <a:blip r:embed="rId7"/>
-          <a:stretch>
-            <a:fillRect/>
-          </a:stretch>
-        </p:blipFill>
-        <p:spPr>
-          <a:xfrm>
-            <a:off x="7664450" y="3442335"/>
-            <a:ext cx="4009390" cy="3007360"/>
           </a:xfrm>
           <a:prstGeom prst="rect">
             <a:avLst/>
@@ -6032,7 +5656,7 @@
       <p:grpSpPr/>
       <p:pic>
         <p:nvPicPr>
-          <p:cNvPr id="4" name="Picture 3"/>
+          <p:cNvPr id="2" name="Picture 1"/>
           <p:cNvPicPr>
             <a:picLocks noChangeAspect="1"/>
           </p:cNvPicPr>
@@ -6046,8 +5670,32 @@
         </p:blipFill>
         <p:spPr>
           <a:xfrm>
-            <a:off x="3336290" y="1988185"/>
-            <a:ext cx="4439285" cy="4343400"/>
+            <a:off x="3794125" y="-352425"/>
+            <a:ext cx="4284345" cy="3213100"/>
+          </a:xfrm>
+          <a:prstGeom prst="rect">
+            <a:avLst/>
+          </a:prstGeom>
+        </p:spPr>
+      </p:pic>
+      <p:pic>
+        <p:nvPicPr>
+          <p:cNvPr id="3" name="Picture 2"/>
+          <p:cNvPicPr>
+            <a:picLocks noChangeAspect="1"/>
+          </p:cNvPicPr>
+          <p:nvPr/>
+        </p:nvPicPr>
+        <p:blipFill>
+          <a:blip r:embed="rId2"/>
+          <a:stretch>
+            <a:fillRect/>
+          </a:stretch>
+        </p:blipFill>
+        <p:spPr>
+          <a:xfrm>
+            <a:off x="3096260" y="1305560"/>
+            <a:ext cx="5999480" cy="5869940"/>
           </a:xfrm>
           <a:prstGeom prst="rect">
             <a:avLst/>
@@ -6072,6 +5720,550 @@
         <p:nvPr/>
       </p:nvGrpSpPr>
       <p:grpSpPr/>
+      <p:sp>
+        <p:nvSpPr>
+          <p:cNvPr id="2" name="Text Box 1"/>
+          <p:cNvSpPr txBox="1"/>
+          <p:nvPr/>
+        </p:nvSpPr>
+        <p:spPr>
+          <a:xfrm>
+            <a:off x="1618615" y="1495425"/>
+            <a:ext cx="2418080" cy="922020"/>
+          </a:xfrm>
+          <a:prstGeom prst="rect">
+            <a:avLst/>
+          </a:prstGeom>
+          <a:noFill/>
+        </p:spPr>
+        <p:txBody>
+          <a:bodyPr wrap="square" rtlCol="0">
+            <a:spAutoFit/>
+          </a:bodyPr>
+          <a:p>
+            <a:r>
+              <a:rPr lang="" altLang="en-US"/>
+              <a:t>abc ahf aei </a:t>
+            </a:r>
+            <a:endParaRPr lang="" altLang="en-US"/>
+          </a:p>
+          <a:p>
+            <a:r>
+              <a:rPr lang="" altLang="en-US"/>
+              <a:t>def dbi dhc</a:t>
+            </a:r>
+            <a:endParaRPr lang="" altLang="en-US"/>
+          </a:p>
+          <a:p>
+            <a:r>
+              <a:rPr lang="" altLang="en-US"/>
+              <a:t>ghi gec gbf</a:t>
+            </a:r>
+            <a:endParaRPr lang="" altLang="en-US"/>
+          </a:p>
+        </p:txBody>
+      </p:sp>
+      <p:cxnSp>
+        <p:nvCxnSpPr>
+          <p:cNvPr id="3" name="Straight Arrow Connector 2"/>
+          <p:cNvCxnSpPr/>
+          <p:nvPr/>
+        </p:nvCxnSpPr>
+        <p:spPr>
+          <a:xfrm>
+            <a:off x="1952625" y="1303655"/>
+            <a:ext cx="0" cy="191770"/>
+          </a:xfrm>
+          <a:prstGeom prst="straightConnector1">
+            <a:avLst/>
+          </a:prstGeom>
+          <a:ln>
+            <a:tailEnd type="arrow"/>
+          </a:ln>
+        </p:spPr>
+        <p:style>
+          <a:lnRef idx="1">
+            <a:schemeClr val="accent1"/>
+          </a:lnRef>
+          <a:fillRef idx="0">
+            <a:schemeClr val="accent1"/>
+          </a:fillRef>
+          <a:effectRef idx="0">
+            <a:schemeClr val="accent1"/>
+          </a:effectRef>
+          <a:fontRef idx="minor">
+            <a:schemeClr val="tx1"/>
+          </a:fontRef>
+        </p:style>
+      </p:cxnSp>
+      <p:cxnSp>
+        <p:nvCxnSpPr>
+          <p:cNvPr id="4" name="Straight Arrow Connector 3"/>
+          <p:cNvCxnSpPr/>
+          <p:nvPr/>
+        </p:nvCxnSpPr>
+        <p:spPr>
+          <a:xfrm>
+            <a:off x="2079625" y="1303655"/>
+            <a:ext cx="0" cy="191770"/>
+          </a:xfrm>
+          <a:prstGeom prst="straightConnector1">
+            <a:avLst/>
+          </a:prstGeom>
+          <a:ln>
+            <a:tailEnd type="arrow"/>
+          </a:ln>
+        </p:spPr>
+        <p:style>
+          <a:lnRef idx="1">
+            <a:schemeClr val="accent1"/>
+          </a:lnRef>
+          <a:fillRef idx="0">
+            <a:schemeClr val="accent1"/>
+          </a:fillRef>
+          <a:effectRef idx="0">
+            <a:schemeClr val="accent1"/>
+          </a:effectRef>
+          <a:fontRef idx="minor">
+            <a:schemeClr val="tx1"/>
+          </a:fontRef>
+        </p:style>
+      </p:cxnSp>
+      <p:cxnSp>
+        <p:nvCxnSpPr>
+          <p:cNvPr id="5" name="Straight Arrow Connector 4"/>
+          <p:cNvCxnSpPr/>
+          <p:nvPr/>
+        </p:nvCxnSpPr>
+        <p:spPr>
+          <a:xfrm>
+            <a:off x="2079625" y="1111885"/>
+            <a:ext cx="0" cy="191770"/>
+          </a:xfrm>
+          <a:prstGeom prst="straightConnector1">
+            <a:avLst/>
+          </a:prstGeom>
+          <a:ln>
+            <a:tailEnd type="arrow"/>
+          </a:ln>
+        </p:spPr>
+        <p:style>
+          <a:lnRef idx="1">
+            <a:schemeClr val="accent1"/>
+          </a:lnRef>
+          <a:fillRef idx="0">
+            <a:schemeClr val="accent1"/>
+          </a:fillRef>
+          <a:effectRef idx="0">
+            <a:schemeClr val="accent1"/>
+          </a:effectRef>
+          <a:fontRef idx="minor">
+            <a:schemeClr val="tx1"/>
+          </a:fontRef>
+        </p:style>
+      </p:cxnSp>
+      <p:pic>
+        <p:nvPicPr>
+          <p:cNvPr id="6" name="Picture 5"/>
+          <p:cNvPicPr>
+            <a:picLocks noChangeAspect="1"/>
+          </p:cNvPicPr>
+          <p:nvPr/>
+        </p:nvPicPr>
+        <p:blipFill>
+          <a:blip r:embed="rId1">
+            <a:clrChange>
+              <a:clrFrom>
+                <a:srgbClr val="0A0000">
+                  <a:alpha val="100000"/>
+                </a:srgbClr>
+              </a:clrFrom>
+              <a:clrTo>
+                <a:srgbClr val="0A0000">
+                  <a:alpha val="100000"/>
+                  <a:alpha val="0"/>
+                </a:srgbClr>
+              </a:clrTo>
+            </a:clrChange>
+            <a:lum bright="30000" contrast="30000"/>
+          </a:blip>
+          <a:stretch>
+            <a:fillRect/>
+          </a:stretch>
+        </p:blipFill>
+        <p:spPr>
+          <a:xfrm>
+            <a:off x="4453890" y="828675"/>
+            <a:ext cx="5158740" cy="4972050"/>
+          </a:xfrm>
+          <a:prstGeom prst="rect">
+            <a:avLst/>
+          </a:prstGeom>
+        </p:spPr>
+      </p:pic>
+      <p:sp>
+        <p:nvSpPr>
+          <p:cNvPr id="7" name="Rectangle 6"/>
+          <p:cNvSpPr/>
+          <p:nvPr/>
+        </p:nvSpPr>
+        <p:spPr>
+          <a:xfrm>
+            <a:off x="1588770" y="1430020"/>
+            <a:ext cx="981710" cy="1052195"/>
+          </a:xfrm>
+          <a:prstGeom prst="rect">
+            <a:avLst/>
+          </a:prstGeom>
+          <a:noFill/>
+          <a:extLst>
+            <a:ext uri="{909E8E84-426E-40DD-AFC4-6F175D3DCCD1}">
+              <a14:hiddenFill xmlns:a14="http://schemas.microsoft.com/office/drawing/2010/main">
+                <a:solidFill>
+                  <a:schemeClr val="lt1"/>
+                </a:solidFill>
+              </a14:hiddenFill>
+            </a:ext>
+          </a:extLst>
+        </p:spPr>
+        <p:style>
+          <a:lnRef idx="2">
+            <a:schemeClr val="accent6"/>
+          </a:lnRef>
+          <a:fillRef idx="1">
+            <a:schemeClr val="lt1"/>
+          </a:fillRef>
+          <a:effectRef idx="0">
+            <a:schemeClr val="accent6"/>
+          </a:effectRef>
+          <a:fontRef idx="minor">
+            <a:schemeClr val="dk1"/>
+          </a:fontRef>
+        </p:style>
+        <p:txBody>
+          <a:bodyPr rtlCol="0" anchor="ctr"/>
+          <a:p>
+            <a:pPr algn="ctr"/>
+            <a:endParaRPr lang="en-US"/>
+          </a:p>
+        </p:txBody>
+      </p:sp>
+      <p:sp>
+        <p:nvSpPr>
+          <p:cNvPr id="8" name="Rectangle 7"/>
+          <p:cNvSpPr/>
+          <p:nvPr/>
+        </p:nvSpPr>
+        <p:spPr>
+          <a:xfrm>
+            <a:off x="5092065" y="969010"/>
+            <a:ext cx="1649095" cy="1704340"/>
+          </a:xfrm>
+          <a:prstGeom prst="rect">
+            <a:avLst/>
+          </a:prstGeom>
+          <a:noFill/>
+          <a:extLst>
+            <a:ext uri="{909E8E84-426E-40DD-AFC4-6F175D3DCCD1}">
+              <a14:hiddenFill xmlns:a14="http://schemas.microsoft.com/office/drawing/2010/main">
+                <a:solidFill>
+                  <a:schemeClr val="lt1"/>
+                </a:solidFill>
+              </a14:hiddenFill>
+            </a:ext>
+          </a:extLst>
+        </p:spPr>
+        <p:style>
+          <a:lnRef idx="2">
+            <a:schemeClr val="accent6"/>
+          </a:lnRef>
+          <a:fillRef idx="1">
+            <a:schemeClr val="lt1"/>
+          </a:fillRef>
+          <a:effectRef idx="0">
+            <a:schemeClr val="accent6"/>
+          </a:effectRef>
+          <a:fontRef idx="minor">
+            <a:schemeClr val="dk1"/>
+          </a:fontRef>
+        </p:style>
+        <p:txBody>
+          <a:bodyPr rtlCol="0" anchor="ctr"/>
+          <a:p>
+            <a:pPr algn="ctr"/>
+            <a:endParaRPr lang="en-US"/>
+          </a:p>
+        </p:txBody>
+      </p:sp>
+      <p:sp>
+        <p:nvSpPr>
+          <p:cNvPr id="9" name="Rectangle 8"/>
+          <p:cNvSpPr/>
+          <p:nvPr/>
+        </p:nvSpPr>
+        <p:spPr>
+          <a:xfrm>
+            <a:off x="1618615" y="1495425"/>
+            <a:ext cx="461010" cy="922020"/>
+          </a:xfrm>
+          <a:prstGeom prst="rect">
+            <a:avLst/>
+          </a:prstGeom>
+          <a:noFill/>
+          <a:ln>
+            <a:solidFill>
+              <a:srgbClr val="FF0000"/>
+            </a:solidFill>
+          </a:ln>
+          <a:extLst>
+            <a:ext uri="{909E8E84-426E-40DD-AFC4-6F175D3DCCD1}">
+              <a14:hiddenFill xmlns:a14="http://schemas.microsoft.com/office/drawing/2010/main">
+                <a:solidFill>
+                  <a:schemeClr val="lt1"/>
+                </a:solidFill>
+              </a14:hiddenFill>
+            </a:ext>
+          </a:extLst>
+        </p:spPr>
+        <p:style>
+          <a:lnRef idx="2">
+            <a:schemeClr val="accent6"/>
+          </a:lnRef>
+          <a:fillRef idx="1">
+            <a:schemeClr val="lt1"/>
+          </a:fillRef>
+          <a:effectRef idx="0">
+            <a:schemeClr val="accent6"/>
+          </a:effectRef>
+          <a:fontRef idx="minor">
+            <a:schemeClr val="dk1"/>
+          </a:fontRef>
+        </p:style>
+        <p:txBody>
+          <a:bodyPr rtlCol="0" anchor="ctr"/>
+          <a:p>
+            <a:pPr algn="ctr"/>
+            <a:endParaRPr lang="en-US"/>
+          </a:p>
+        </p:txBody>
+      </p:sp>
+      <p:sp>
+        <p:nvSpPr>
+          <p:cNvPr id="10" name="Rectangle 9"/>
+          <p:cNvSpPr/>
+          <p:nvPr/>
+        </p:nvSpPr>
+        <p:spPr>
+          <a:xfrm>
+            <a:off x="5215255" y="1111885"/>
+            <a:ext cx="730885" cy="748030"/>
+          </a:xfrm>
+          <a:prstGeom prst="rect">
+            <a:avLst/>
+          </a:prstGeom>
+          <a:noFill/>
+          <a:ln>
+            <a:solidFill>
+              <a:srgbClr val="FF0000"/>
+            </a:solidFill>
+          </a:ln>
+          <a:extLst>
+            <a:ext uri="{909E8E84-426E-40DD-AFC4-6F175D3DCCD1}">
+              <a14:hiddenFill xmlns:a14="http://schemas.microsoft.com/office/drawing/2010/main">
+                <a:solidFill>
+                  <a:schemeClr val="lt1"/>
+                </a:solidFill>
+              </a14:hiddenFill>
+            </a:ext>
+          </a:extLst>
+        </p:spPr>
+        <p:style>
+          <a:lnRef idx="2">
+            <a:schemeClr val="accent6"/>
+          </a:lnRef>
+          <a:fillRef idx="1">
+            <a:schemeClr val="lt1"/>
+          </a:fillRef>
+          <a:effectRef idx="0">
+            <a:schemeClr val="accent6"/>
+          </a:effectRef>
+          <a:fontRef idx="minor">
+            <a:schemeClr val="dk1"/>
+          </a:fontRef>
+        </p:style>
+        <p:txBody>
+          <a:bodyPr rtlCol="0" anchor="ctr"/>
+          <a:p>
+            <a:pPr algn="ctr"/>
+            <a:endParaRPr lang="en-US"/>
+          </a:p>
+        </p:txBody>
+      </p:sp>
+      <p:sp>
+        <p:nvSpPr>
+          <p:cNvPr id="11" name="Rectangle 10"/>
+          <p:cNvSpPr/>
+          <p:nvPr/>
+        </p:nvSpPr>
+        <p:spPr>
+          <a:xfrm>
+            <a:off x="1478915" y="1303655"/>
+            <a:ext cx="1649095" cy="1369060"/>
+          </a:xfrm>
+          <a:prstGeom prst="rect">
+            <a:avLst/>
+          </a:prstGeom>
+          <a:noFill/>
+          <a:ln>
+            <a:solidFill>
+              <a:srgbClr val="00B0F0"/>
+            </a:solidFill>
+          </a:ln>
+          <a:extLst>
+            <a:ext uri="{909E8E84-426E-40DD-AFC4-6F175D3DCCD1}">
+              <a14:hiddenFill xmlns:a14="http://schemas.microsoft.com/office/drawing/2010/main">
+                <a:solidFill>
+                  <a:schemeClr val="lt1"/>
+                </a:solidFill>
+              </a14:hiddenFill>
+            </a:ext>
+          </a:extLst>
+        </p:spPr>
+        <p:style>
+          <a:lnRef idx="2">
+            <a:schemeClr val="accent6"/>
+          </a:lnRef>
+          <a:fillRef idx="1">
+            <a:schemeClr val="lt1"/>
+          </a:fillRef>
+          <a:effectRef idx="0">
+            <a:schemeClr val="accent6"/>
+          </a:effectRef>
+          <a:fontRef idx="minor">
+            <a:schemeClr val="dk1"/>
+          </a:fontRef>
+        </p:style>
+        <p:txBody>
+          <a:bodyPr rtlCol="0" anchor="ctr"/>
+          <a:p>
+            <a:pPr algn="ctr"/>
+            <a:endParaRPr lang="en-US"/>
+          </a:p>
+        </p:txBody>
+      </p:sp>
+      <p:sp>
+        <p:nvSpPr>
+          <p:cNvPr id="12" name="Rectangle 11"/>
+          <p:cNvSpPr/>
+          <p:nvPr/>
+        </p:nvSpPr>
+        <p:spPr>
+          <a:xfrm>
+            <a:off x="4996815" y="828675"/>
+            <a:ext cx="1887855" cy="1969135"/>
+          </a:xfrm>
+          <a:prstGeom prst="rect">
+            <a:avLst/>
+          </a:prstGeom>
+          <a:noFill/>
+          <a:ln>
+            <a:solidFill>
+              <a:srgbClr val="00B0F0"/>
+            </a:solidFill>
+          </a:ln>
+          <a:extLst>
+            <a:ext uri="{909E8E84-426E-40DD-AFC4-6F175D3DCCD1}">
+              <a14:hiddenFill xmlns:a14="http://schemas.microsoft.com/office/drawing/2010/main">
+                <a:solidFill>
+                  <a:schemeClr val="lt1"/>
+                </a:solidFill>
+              </a14:hiddenFill>
+            </a:ext>
+          </a:extLst>
+        </p:spPr>
+        <p:style>
+          <a:lnRef idx="2">
+            <a:schemeClr val="accent6"/>
+          </a:lnRef>
+          <a:fillRef idx="1">
+            <a:schemeClr val="lt1"/>
+          </a:fillRef>
+          <a:effectRef idx="0">
+            <a:schemeClr val="accent6"/>
+          </a:effectRef>
+          <a:fontRef idx="minor">
+            <a:schemeClr val="dk1"/>
+          </a:fontRef>
+        </p:style>
+        <p:txBody>
+          <a:bodyPr rtlCol="0" anchor="ctr"/>
+          <a:p>
+            <a:pPr algn="ctr"/>
+            <a:endParaRPr lang="en-US"/>
+          </a:p>
+        </p:txBody>
+      </p:sp>
+      <p:sp>
+        <p:nvSpPr>
+          <p:cNvPr id="13" name="Text Box 12"/>
+          <p:cNvSpPr txBox="1"/>
+          <p:nvPr/>
+        </p:nvSpPr>
+        <p:spPr>
+          <a:xfrm>
+            <a:off x="1399540" y="3157855"/>
+            <a:ext cx="1511935" cy="922020"/>
+          </a:xfrm>
+          <a:prstGeom prst="rect">
+            <a:avLst/>
+          </a:prstGeom>
+          <a:noFill/>
+        </p:spPr>
+        <p:txBody>
+          <a:bodyPr wrap="square" rtlCol="0">
+            <a:spAutoFit/>
+          </a:bodyPr>
+          <a:p>
+            <a:r>
+              <a:rPr lang="" altLang="en-US">
+                <a:latin typeface="FreeMono" panose="020F0409020205020404" charset="0"/>
+                <a:cs typeface="FreeMono" panose="020F0409020205020404" charset="0"/>
+              </a:rPr>
+              <a:t>adg  </a:t>
+            </a:r>
+            <a:endParaRPr lang="" altLang="en-US">
+              <a:latin typeface="FreeMono" panose="020F0409020205020404" charset="0"/>
+              <a:cs typeface="FreeMono" panose="020F0409020205020404" charset="0"/>
+            </a:endParaRPr>
+          </a:p>
+          <a:p>
+            <a:r>
+              <a:rPr lang="" altLang="en-US">
+                <a:latin typeface="FreeMono" panose="020F0409020205020404" charset="0"/>
+                <a:cs typeface="FreeMono" panose="020F0409020205020404" charset="0"/>
+              </a:rPr>
+              <a:t>beh </a:t>
+            </a:r>
+            <a:endParaRPr lang="" altLang="en-US">
+              <a:latin typeface="FreeMono" panose="020F0409020205020404" charset="0"/>
+              <a:cs typeface="FreeMono" panose="020F0409020205020404" charset="0"/>
+            </a:endParaRPr>
+          </a:p>
+          <a:p>
+            <a:r>
+              <a:rPr lang="" altLang="en-US">
+                <a:latin typeface="FreeMono" panose="020F0409020205020404" charset="0"/>
+                <a:cs typeface="FreeMono" panose="020F0409020205020404" charset="0"/>
+              </a:rPr>
+              <a:t>cfi </a:t>
+            </a:r>
+            <a:endParaRPr lang="" altLang="en-US">
+              <a:latin typeface="FreeMono" panose="020F0409020205020404" charset="0"/>
+              <a:cs typeface="FreeMono" panose="020F0409020205020404" charset="0"/>
+            </a:endParaRPr>
+          </a:p>
+        </p:txBody>
+      </p:sp>
     </p:spTree>
   </p:cSld>
   <p:clrMapOvr>
@@ -6090,71 +6282,176 @@
         <p:nvPr/>
       </p:nvGrpSpPr>
       <p:grpSpPr/>
-      <p:pic>
-        <p:nvPicPr>
-          <p:cNvPr id="10" name="Picture 9"/>
-          <p:cNvPicPr>
-            <a:picLocks noChangeAspect="1"/>
-          </p:cNvPicPr>
-          <p:nvPr/>
-        </p:nvPicPr>
-        <p:blipFill>
-          <a:blip r:embed="rId1"/>
-          <a:stretch>
-            <a:fillRect/>
-          </a:stretch>
-        </p:blipFill>
-        <p:spPr>
-          <a:xfrm>
-            <a:off x="1514475" y="2829560"/>
-            <a:ext cx="3504565" cy="3467735"/>
-          </a:xfrm>
-          <a:prstGeom prst="rect">
-            <a:avLst/>
-          </a:prstGeom>
-        </p:spPr>
-      </p:pic>
-      <p:pic>
-        <p:nvPicPr>
-          <p:cNvPr id="11" name="Picture 10"/>
-          <p:cNvPicPr>
-            <a:picLocks noChangeAspect="1"/>
-          </p:cNvPicPr>
-          <p:nvPr/>
-        </p:nvPicPr>
-        <p:blipFill>
-          <a:blip r:embed="rId2"/>
-          <a:stretch>
-            <a:fillRect/>
-          </a:stretch>
-        </p:blipFill>
-        <p:spPr>
-          <a:xfrm>
-            <a:off x="5184140" y="285750"/>
-            <a:ext cx="2835910" cy="6011545"/>
-          </a:xfrm>
-          <a:prstGeom prst="rect">
-            <a:avLst/>
-          </a:prstGeom>
-        </p:spPr>
-      </p:pic>
+      <p:sp>
+        <p:nvSpPr>
+          <p:cNvPr id="4" name="Rectangle 3"/>
+          <p:cNvSpPr/>
+          <p:nvPr/>
+        </p:nvSpPr>
+        <p:spPr>
+          <a:xfrm>
+            <a:off x="2576830" y="3540125"/>
+            <a:ext cx="254635" cy="2037080"/>
+          </a:xfrm>
+          <a:prstGeom prst="rect">
+            <a:avLst/>
+          </a:prstGeom>
+        </p:spPr>
+        <p:style>
+          <a:lnRef idx="2">
+            <a:schemeClr val="accent1">
+              <a:shade val="50000"/>
+            </a:schemeClr>
+          </a:lnRef>
+          <a:fillRef idx="1">
+            <a:schemeClr val="accent1"/>
+          </a:fillRef>
+          <a:effectRef idx="0">
+            <a:schemeClr val="accent1"/>
+          </a:effectRef>
+          <a:fontRef idx="minor">
+            <a:schemeClr val="lt1"/>
+          </a:fontRef>
+        </p:style>
+        <p:txBody>
+          <a:bodyPr rtlCol="0" anchor="ctr"/>
+          <a:p>
+            <a:pPr algn="ctr"/>
+            <a:endParaRPr lang="en-US"/>
+          </a:p>
+        </p:txBody>
+      </p:sp>
+      <p:sp>
+        <p:nvSpPr>
+          <p:cNvPr id="5" name="Rectangle 4"/>
+          <p:cNvSpPr/>
+          <p:nvPr/>
+        </p:nvSpPr>
+        <p:spPr>
+          <a:xfrm>
+            <a:off x="2831465" y="5323205"/>
+            <a:ext cx="1304290" cy="254000"/>
+          </a:xfrm>
+          <a:prstGeom prst="rect">
+            <a:avLst/>
+          </a:prstGeom>
+        </p:spPr>
+        <p:style>
+          <a:lnRef idx="2">
+            <a:schemeClr val="accent1">
+              <a:shade val="50000"/>
+            </a:schemeClr>
+          </a:lnRef>
+          <a:fillRef idx="1">
+            <a:schemeClr val="accent1"/>
+          </a:fillRef>
+          <a:effectRef idx="0">
+            <a:schemeClr val="accent1"/>
+          </a:effectRef>
+          <a:fontRef idx="minor">
+            <a:schemeClr val="lt1"/>
+          </a:fontRef>
+        </p:style>
+        <p:txBody>
+          <a:bodyPr rtlCol="0" anchor="ctr"/>
+          <a:p>
+            <a:pPr algn="ctr"/>
+            <a:endParaRPr lang="en-US"/>
+          </a:p>
+        </p:txBody>
+      </p:sp>
+      <p:sp>
+        <p:nvSpPr>
+          <p:cNvPr id="6" name="Rectangle 5"/>
+          <p:cNvSpPr/>
+          <p:nvPr/>
+        </p:nvSpPr>
+        <p:spPr>
+          <a:xfrm>
+            <a:off x="4135755" y="3540125"/>
+            <a:ext cx="254635" cy="2037080"/>
+          </a:xfrm>
+          <a:prstGeom prst="rect">
+            <a:avLst/>
+          </a:prstGeom>
+        </p:spPr>
+        <p:style>
+          <a:lnRef idx="2">
+            <a:schemeClr val="accent1">
+              <a:shade val="50000"/>
+            </a:schemeClr>
+          </a:lnRef>
+          <a:fillRef idx="1">
+            <a:schemeClr val="accent1"/>
+          </a:fillRef>
+          <a:effectRef idx="0">
+            <a:schemeClr val="accent1"/>
+          </a:effectRef>
+          <a:fontRef idx="minor">
+            <a:schemeClr val="lt1"/>
+          </a:fontRef>
+        </p:style>
+        <p:txBody>
+          <a:bodyPr rtlCol="0" anchor="ctr"/>
+          <a:p>
+            <a:pPr algn="ctr"/>
+            <a:endParaRPr lang="en-US"/>
+          </a:p>
+        </p:txBody>
+      </p:sp>
+      <p:sp>
+        <p:nvSpPr>
+          <p:cNvPr id="7" name="Rectangle 6"/>
+          <p:cNvSpPr/>
+          <p:nvPr/>
+        </p:nvSpPr>
+        <p:spPr>
+          <a:xfrm>
+            <a:off x="2831465" y="3747135"/>
+            <a:ext cx="1304290" cy="254000"/>
+          </a:xfrm>
+          <a:prstGeom prst="rect">
+            <a:avLst/>
+          </a:prstGeom>
+        </p:spPr>
+        <p:style>
+          <a:lnRef idx="2">
+            <a:schemeClr val="accent3">
+              <a:shade val="50000"/>
+            </a:schemeClr>
+          </a:lnRef>
+          <a:fillRef idx="1">
+            <a:schemeClr val="accent3"/>
+          </a:fillRef>
+          <a:effectRef idx="0">
+            <a:schemeClr val="accent3"/>
+          </a:effectRef>
+          <a:fontRef idx="minor">
+            <a:schemeClr val="lt1"/>
+          </a:fontRef>
+        </p:style>
+        <p:txBody>
+          <a:bodyPr rtlCol="0" anchor="ctr"/>
+          <a:p>
+            <a:pPr algn="ctr"/>
+            <a:endParaRPr lang="en-US"/>
+          </a:p>
+        </p:txBody>
+      </p:sp>
       <p:cxnSp>
         <p:nvCxnSpPr>
-          <p:cNvPr id="12" name="Straight Arrow Connector 11"/>
+          <p:cNvPr id="11" name="Straight Connector 10"/>
           <p:cNvCxnSpPr/>
           <p:nvPr/>
         </p:nvCxnSpPr>
         <p:spPr>
-          <a:xfrm flipH="1">
-            <a:off x="8020050" y="2139950"/>
-            <a:ext cx="533400" cy="0"/>
-          </a:xfrm>
-          <a:prstGeom prst="straightConnector1">
-            <a:avLst/>
-          </a:prstGeom>
-          <a:ln>
-            <a:tailEnd type="arrow"/>
-          </a:ln>
+          <a:xfrm flipV="1">
+            <a:off x="3679825" y="3110230"/>
+            <a:ext cx="330200" cy="1909445"/>
+          </a:xfrm>
+          <a:prstGeom prst="line">
+            <a:avLst/>
+          </a:prstGeom>
         </p:spPr>
         <p:style>
           <a:lnRef idx="1">
@@ -6173,21 +6470,18 @@
       </p:cxnSp>
       <p:cxnSp>
         <p:nvCxnSpPr>
-          <p:cNvPr id="13" name="Straight Arrow Connector 12"/>
+          <p:cNvPr id="12" name="Straight Connector 11"/>
           <p:cNvCxnSpPr/>
           <p:nvPr/>
         </p:nvCxnSpPr>
         <p:spPr>
           <a:xfrm flipH="1">
-            <a:off x="8020050" y="3054350"/>
-            <a:ext cx="533400" cy="0"/>
-          </a:xfrm>
-          <a:prstGeom prst="straightConnector1">
-            <a:avLst/>
-          </a:prstGeom>
-          <a:ln>
-            <a:tailEnd type="arrow"/>
-          </a:ln>
+            <a:off x="3994150" y="1358900"/>
+            <a:ext cx="3278505" cy="1751330"/>
+          </a:xfrm>
+          <a:prstGeom prst="line">
+            <a:avLst/>
+          </a:prstGeom>
         </p:spPr>
         <p:style>
           <a:lnRef idx="1">
@@ -6204,30 +6498,651 @@
           </a:fontRef>
         </p:style>
       </p:cxnSp>
-      <p:pic>
-        <p:nvPicPr>
-          <p:cNvPr id="15" name="Picture 14"/>
-          <p:cNvPicPr>
-            <a:picLocks noChangeAspect="1"/>
-          </p:cNvPicPr>
-          <p:nvPr/>
-        </p:nvPicPr>
-        <p:blipFill>
-          <a:blip r:embed="rId3"/>
-          <a:stretch>
-            <a:fillRect/>
-          </a:stretch>
-        </p:blipFill>
-        <p:spPr>
-          <a:xfrm>
-            <a:off x="953135" y="1071245"/>
-            <a:ext cx="4065905" cy="1487170"/>
-          </a:xfrm>
-          <a:prstGeom prst="rect">
-            <a:avLst/>
-          </a:prstGeom>
-        </p:spPr>
-      </p:pic>
+      <p:sp>
+        <p:nvSpPr>
+          <p:cNvPr id="15" name="Rectangle 14"/>
+          <p:cNvSpPr/>
+          <p:nvPr/>
+        </p:nvSpPr>
+        <p:spPr>
+          <a:xfrm>
+            <a:off x="10231755" y="3747135"/>
+            <a:ext cx="254635" cy="2037080"/>
+          </a:xfrm>
+          <a:prstGeom prst="rect">
+            <a:avLst/>
+          </a:prstGeom>
+        </p:spPr>
+        <p:style>
+          <a:lnRef idx="2">
+            <a:schemeClr val="accent1">
+              <a:shade val="50000"/>
+            </a:schemeClr>
+          </a:lnRef>
+          <a:fillRef idx="1">
+            <a:schemeClr val="accent1"/>
+          </a:fillRef>
+          <a:effectRef idx="0">
+            <a:schemeClr val="accent1"/>
+          </a:effectRef>
+          <a:fontRef idx="minor">
+            <a:schemeClr val="lt1"/>
+          </a:fontRef>
+        </p:style>
+        <p:txBody>
+          <a:bodyPr rtlCol="0" anchor="ctr"/>
+          <a:p>
+            <a:pPr algn="ctr"/>
+            <a:endParaRPr lang="en-US"/>
+          </a:p>
+        </p:txBody>
+      </p:sp>
+      <p:sp>
+        <p:nvSpPr>
+          <p:cNvPr id="16" name="Rectangle 15"/>
+          <p:cNvSpPr/>
+          <p:nvPr/>
+        </p:nvSpPr>
+        <p:spPr>
+          <a:xfrm>
+            <a:off x="10486390" y="5530215"/>
+            <a:ext cx="1304290" cy="254000"/>
+          </a:xfrm>
+          <a:prstGeom prst="rect">
+            <a:avLst/>
+          </a:prstGeom>
+        </p:spPr>
+        <p:style>
+          <a:lnRef idx="2">
+            <a:schemeClr val="accent1">
+              <a:shade val="50000"/>
+            </a:schemeClr>
+          </a:lnRef>
+          <a:fillRef idx="1">
+            <a:schemeClr val="accent1"/>
+          </a:fillRef>
+          <a:effectRef idx="0">
+            <a:schemeClr val="accent1"/>
+          </a:effectRef>
+          <a:fontRef idx="minor">
+            <a:schemeClr val="lt1"/>
+          </a:fontRef>
+        </p:style>
+        <p:txBody>
+          <a:bodyPr rtlCol="0" anchor="ctr"/>
+          <a:p>
+            <a:pPr algn="ctr"/>
+            <a:endParaRPr lang="en-US"/>
+          </a:p>
+        </p:txBody>
+      </p:sp>
+      <p:sp>
+        <p:nvSpPr>
+          <p:cNvPr id="17" name="Rectangle 16"/>
+          <p:cNvSpPr/>
+          <p:nvPr/>
+        </p:nvSpPr>
+        <p:spPr>
+          <a:xfrm>
+            <a:off x="11790680" y="3747135"/>
+            <a:ext cx="254635" cy="2037080"/>
+          </a:xfrm>
+          <a:prstGeom prst="rect">
+            <a:avLst/>
+          </a:prstGeom>
+        </p:spPr>
+        <p:style>
+          <a:lnRef idx="2">
+            <a:schemeClr val="accent1">
+              <a:shade val="50000"/>
+            </a:schemeClr>
+          </a:lnRef>
+          <a:fillRef idx="1">
+            <a:schemeClr val="accent1"/>
+          </a:fillRef>
+          <a:effectRef idx="0">
+            <a:schemeClr val="accent1"/>
+          </a:effectRef>
+          <a:fontRef idx="minor">
+            <a:schemeClr val="lt1"/>
+          </a:fontRef>
+        </p:style>
+        <p:txBody>
+          <a:bodyPr rtlCol="0" anchor="ctr"/>
+          <a:p>
+            <a:pPr algn="ctr"/>
+            <a:endParaRPr lang="en-US"/>
+          </a:p>
+        </p:txBody>
+      </p:sp>
+      <p:cxnSp>
+        <p:nvCxnSpPr>
+          <p:cNvPr id="19" name="Straight Connector 18"/>
+          <p:cNvCxnSpPr/>
+          <p:nvPr/>
+        </p:nvCxnSpPr>
+        <p:spPr>
+          <a:xfrm flipV="1">
+            <a:off x="11503025" y="1360170"/>
+            <a:ext cx="0" cy="3963035"/>
+          </a:xfrm>
+          <a:prstGeom prst="line">
+            <a:avLst/>
+          </a:prstGeom>
+        </p:spPr>
+        <p:style>
+          <a:lnRef idx="1">
+            <a:schemeClr val="accent1"/>
+          </a:lnRef>
+          <a:fillRef idx="0">
+            <a:schemeClr val="accent1"/>
+          </a:fillRef>
+          <a:effectRef idx="0">
+            <a:schemeClr val="accent1"/>
+          </a:effectRef>
+          <a:fontRef idx="minor">
+            <a:schemeClr val="tx1"/>
+          </a:fontRef>
+        </p:style>
+      </p:cxnSp>
+      <p:cxnSp>
+        <p:nvCxnSpPr>
+          <p:cNvPr id="20" name="Straight Connector 19"/>
+          <p:cNvCxnSpPr/>
+          <p:nvPr/>
+        </p:nvCxnSpPr>
+        <p:spPr>
+          <a:xfrm flipH="1">
+            <a:off x="7209155" y="1360170"/>
+            <a:ext cx="4293870" cy="14605"/>
+          </a:xfrm>
+          <a:prstGeom prst="line">
+            <a:avLst/>
+          </a:prstGeom>
+        </p:spPr>
+        <p:style>
+          <a:lnRef idx="1">
+            <a:schemeClr val="accent1"/>
+          </a:lnRef>
+          <a:fillRef idx="0">
+            <a:schemeClr val="accent1"/>
+          </a:fillRef>
+          <a:effectRef idx="0">
+            <a:schemeClr val="accent1"/>
+          </a:effectRef>
+          <a:fontRef idx="minor">
+            <a:schemeClr val="tx1"/>
+          </a:fontRef>
+        </p:style>
+      </p:cxnSp>
+      <p:sp>
+        <p:nvSpPr>
+          <p:cNvPr id="25" name="Rectangle 24"/>
+          <p:cNvSpPr/>
+          <p:nvPr/>
+        </p:nvSpPr>
+        <p:spPr>
+          <a:xfrm>
+            <a:off x="614680" y="3540125"/>
+            <a:ext cx="254635" cy="2037080"/>
+          </a:xfrm>
+          <a:prstGeom prst="rect">
+            <a:avLst/>
+          </a:prstGeom>
+        </p:spPr>
+        <p:style>
+          <a:lnRef idx="2">
+            <a:schemeClr val="accent1">
+              <a:shade val="50000"/>
+            </a:schemeClr>
+          </a:lnRef>
+          <a:fillRef idx="1">
+            <a:schemeClr val="accent1"/>
+          </a:fillRef>
+          <a:effectRef idx="0">
+            <a:schemeClr val="accent1"/>
+          </a:effectRef>
+          <a:fontRef idx="minor">
+            <a:schemeClr val="lt1"/>
+          </a:fontRef>
+        </p:style>
+        <p:txBody>
+          <a:bodyPr rtlCol="0" anchor="ctr"/>
+          <a:p>
+            <a:pPr algn="ctr"/>
+            <a:endParaRPr lang="en-US"/>
+          </a:p>
+        </p:txBody>
+      </p:sp>
+      <p:sp>
+        <p:nvSpPr>
+          <p:cNvPr id="26" name="Rectangle 25"/>
+          <p:cNvSpPr/>
+          <p:nvPr/>
+        </p:nvSpPr>
+        <p:spPr>
+          <a:xfrm>
+            <a:off x="869315" y="5323205"/>
+            <a:ext cx="1304290" cy="254000"/>
+          </a:xfrm>
+          <a:prstGeom prst="rect">
+            <a:avLst/>
+          </a:prstGeom>
+        </p:spPr>
+        <p:style>
+          <a:lnRef idx="2">
+            <a:schemeClr val="accent1">
+              <a:shade val="50000"/>
+            </a:schemeClr>
+          </a:lnRef>
+          <a:fillRef idx="1">
+            <a:schemeClr val="accent1"/>
+          </a:fillRef>
+          <a:effectRef idx="0">
+            <a:schemeClr val="accent1"/>
+          </a:effectRef>
+          <a:fontRef idx="minor">
+            <a:schemeClr val="lt1"/>
+          </a:fontRef>
+        </p:style>
+        <p:txBody>
+          <a:bodyPr rtlCol="0" anchor="ctr"/>
+          <a:p>
+            <a:pPr algn="ctr"/>
+            <a:endParaRPr lang="en-US"/>
+          </a:p>
+        </p:txBody>
+      </p:sp>
+      <p:sp>
+        <p:nvSpPr>
+          <p:cNvPr id="27" name="Rectangle 26"/>
+          <p:cNvSpPr/>
+          <p:nvPr/>
+        </p:nvSpPr>
+        <p:spPr>
+          <a:xfrm>
+            <a:off x="2173605" y="3540125"/>
+            <a:ext cx="254635" cy="2037080"/>
+          </a:xfrm>
+          <a:prstGeom prst="rect">
+            <a:avLst/>
+          </a:prstGeom>
+        </p:spPr>
+        <p:style>
+          <a:lnRef idx="2">
+            <a:schemeClr val="accent1">
+              <a:shade val="50000"/>
+            </a:schemeClr>
+          </a:lnRef>
+          <a:fillRef idx="1">
+            <a:schemeClr val="accent1"/>
+          </a:fillRef>
+          <a:effectRef idx="0">
+            <a:schemeClr val="accent1"/>
+          </a:effectRef>
+          <a:fontRef idx="minor">
+            <a:schemeClr val="lt1"/>
+          </a:fontRef>
+        </p:style>
+        <p:txBody>
+          <a:bodyPr rtlCol="0" anchor="ctr"/>
+          <a:p>
+            <a:pPr algn="ctr"/>
+            <a:endParaRPr lang="en-US"/>
+          </a:p>
+        </p:txBody>
+      </p:sp>
+      <p:sp>
+        <p:nvSpPr>
+          <p:cNvPr id="28" name="Rectangle 27"/>
+          <p:cNvSpPr/>
+          <p:nvPr/>
+        </p:nvSpPr>
+        <p:spPr>
+          <a:xfrm>
+            <a:off x="869315" y="3747135"/>
+            <a:ext cx="1304290" cy="254000"/>
+          </a:xfrm>
+          <a:prstGeom prst="rect">
+            <a:avLst/>
+          </a:prstGeom>
+        </p:spPr>
+        <p:style>
+          <a:lnRef idx="2">
+            <a:schemeClr val="accent3">
+              <a:shade val="50000"/>
+            </a:schemeClr>
+          </a:lnRef>
+          <a:fillRef idx="1">
+            <a:schemeClr val="accent3"/>
+          </a:fillRef>
+          <a:effectRef idx="0">
+            <a:schemeClr val="accent3"/>
+          </a:effectRef>
+          <a:fontRef idx="minor">
+            <a:schemeClr val="lt1"/>
+          </a:fontRef>
+        </p:style>
+        <p:txBody>
+          <a:bodyPr rtlCol="0" anchor="ctr"/>
+          <a:p>
+            <a:pPr algn="ctr"/>
+            <a:endParaRPr lang="en-US"/>
+          </a:p>
+        </p:txBody>
+      </p:sp>
+      <p:cxnSp>
+        <p:nvCxnSpPr>
+          <p:cNvPr id="29" name="Straight Arrow Connector 28"/>
+          <p:cNvCxnSpPr/>
+          <p:nvPr/>
+        </p:nvCxnSpPr>
+        <p:spPr>
+          <a:xfrm>
+            <a:off x="1235075" y="2306955"/>
+            <a:ext cx="0" cy="1050290"/>
+          </a:xfrm>
+          <a:prstGeom prst="straightConnector1">
+            <a:avLst/>
+          </a:prstGeom>
+          <a:ln>
+            <a:tailEnd type="arrow"/>
+          </a:ln>
+        </p:spPr>
+        <p:style>
+          <a:lnRef idx="1">
+            <a:schemeClr val="accent1"/>
+          </a:lnRef>
+          <a:fillRef idx="0">
+            <a:schemeClr val="accent1"/>
+          </a:fillRef>
+          <a:effectRef idx="0">
+            <a:schemeClr val="accent1"/>
+          </a:effectRef>
+          <a:fontRef idx="minor">
+            <a:schemeClr val="tx1"/>
+          </a:fontRef>
+        </p:style>
+      </p:cxnSp>
+      <p:cxnSp>
+        <p:nvCxnSpPr>
+          <p:cNvPr id="30" name="Straight Connector 29"/>
+          <p:cNvCxnSpPr/>
+          <p:nvPr/>
+        </p:nvCxnSpPr>
+        <p:spPr>
+          <a:xfrm flipV="1">
+            <a:off x="1606550" y="2791460"/>
+            <a:ext cx="541020" cy="2228215"/>
+          </a:xfrm>
+          <a:prstGeom prst="line">
+            <a:avLst/>
+          </a:prstGeom>
+        </p:spPr>
+        <p:style>
+          <a:lnRef idx="1">
+            <a:schemeClr val="accent1"/>
+          </a:lnRef>
+          <a:fillRef idx="0">
+            <a:schemeClr val="accent1"/>
+          </a:fillRef>
+          <a:effectRef idx="0">
+            <a:schemeClr val="accent1"/>
+          </a:effectRef>
+          <a:fontRef idx="minor">
+            <a:schemeClr val="tx1"/>
+          </a:fontRef>
+        </p:style>
+      </p:cxnSp>
+      <p:cxnSp>
+        <p:nvCxnSpPr>
+          <p:cNvPr id="31" name="Straight Connector 30"/>
+          <p:cNvCxnSpPr/>
+          <p:nvPr/>
+        </p:nvCxnSpPr>
+        <p:spPr>
+          <a:xfrm flipH="1">
+            <a:off x="2115820" y="2473325"/>
+            <a:ext cx="7401560" cy="349885"/>
+          </a:xfrm>
+          <a:prstGeom prst="line">
+            <a:avLst/>
+          </a:prstGeom>
+        </p:spPr>
+        <p:style>
+          <a:lnRef idx="1">
+            <a:schemeClr val="accent1"/>
+          </a:lnRef>
+          <a:fillRef idx="0">
+            <a:schemeClr val="accent1"/>
+          </a:fillRef>
+          <a:effectRef idx="0">
+            <a:schemeClr val="accent1"/>
+          </a:effectRef>
+          <a:fontRef idx="minor">
+            <a:schemeClr val="tx1"/>
+          </a:fontRef>
+        </p:style>
+      </p:cxnSp>
+      <p:sp>
+        <p:nvSpPr>
+          <p:cNvPr id="33" name="Rectangle 32"/>
+          <p:cNvSpPr/>
+          <p:nvPr/>
+        </p:nvSpPr>
+        <p:spPr>
+          <a:xfrm>
+            <a:off x="8444230" y="2855595"/>
+            <a:ext cx="254635" cy="2037080"/>
+          </a:xfrm>
+          <a:prstGeom prst="rect">
+            <a:avLst/>
+          </a:prstGeom>
+        </p:spPr>
+        <p:style>
+          <a:lnRef idx="2">
+            <a:schemeClr val="accent1">
+              <a:shade val="50000"/>
+            </a:schemeClr>
+          </a:lnRef>
+          <a:fillRef idx="1">
+            <a:schemeClr val="accent1"/>
+          </a:fillRef>
+          <a:effectRef idx="0">
+            <a:schemeClr val="accent1"/>
+          </a:effectRef>
+          <a:fontRef idx="minor">
+            <a:schemeClr val="lt1"/>
+          </a:fontRef>
+        </p:style>
+        <p:txBody>
+          <a:bodyPr rtlCol="0" anchor="ctr"/>
+          <a:p>
+            <a:pPr algn="ctr"/>
+            <a:endParaRPr lang="en-US"/>
+          </a:p>
+        </p:txBody>
+      </p:sp>
+      <p:sp>
+        <p:nvSpPr>
+          <p:cNvPr id="34" name="Rectangle 33"/>
+          <p:cNvSpPr/>
+          <p:nvPr/>
+        </p:nvSpPr>
+        <p:spPr>
+          <a:xfrm>
+            <a:off x="8698865" y="4638675"/>
+            <a:ext cx="1304290" cy="254000"/>
+          </a:xfrm>
+          <a:prstGeom prst="rect">
+            <a:avLst/>
+          </a:prstGeom>
+        </p:spPr>
+        <p:style>
+          <a:lnRef idx="2">
+            <a:schemeClr val="accent1">
+              <a:shade val="50000"/>
+            </a:schemeClr>
+          </a:lnRef>
+          <a:fillRef idx="1">
+            <a:schemeClr val="accent1"/>
+          </a:fillRef>
+          <a:effectRef idx="0">
+            <a:schemeClr val="accent1"/>
+          </a:effectRef>
+          <a:fontRef idx="minor">
+            <a:schemeClr val="lt1"/>
+          </a:fontRef>
+        </p:style>
+        <p:txBody>
+          <a:bodyPr rtlCol="0" anchor="ctr"/>
+          <a:p>
+            <a:pPr algn="ctr"/>
+            <a:endParaRPr lang="en-US"/>
+          </a:p>
+        </p:txBody>
+      </p:sp>
+      <p:sp>
+        <p:nvSpPr>
+          <p:cNvPr id="35" name="Rectangle 34"/>
+          <p:cNvSpPr/>
+          <p:nvPr/>
+        </p:nvSpPr>
+        <p:spPr>
+          <a:xfrm>
+            <a:off x="10003155" y="2855595"/>
+            <a:ext cx="254635" cy="2037080"/>
+          </a:xfrm>
+          <a:prstGeom prst="rect">
+            <a:avLst/>
+          </a:prstGeom>
+        </p:spPr>
+        <p:style>
+          <a:lnRef idx="2">
+            <a:schemeClr val="accent1">
+              <a:shade val="50000"/>
+            </a:schemeClr>
+          </a:lnRef>
+          <a:fillRef idx="1">
+            <a:schemeClr val="accent1"/>
+          </a:fillRef>
+          <a:effectRef idx="0">
+            <a:schemeClr val="accent1"/>
+          </a:effectRef>
+          <a:fontRef idx="minor">
+            <a:schemeClr val="lt1"/>
+          </a:fontRef>
+        </p:style>
+        <p:txBody>
+          <a:bodyPr rtlCol="0" anchor="ctr"/>
+          <a:p>
+            <a:pPr algn="ctr"/>
+            <a:endParaRPr lang="en-US"/>
+          </a:p>
+        </p:txBody>
+      </p:sp>
+      <p:cxnSp>
+        <p:nvCxnSpPr>
+          <p:cNvPr id="36" name="Straight Connector 35"/>
+          <p:cNvCxnSpPr/>
+          <p:nvPr/>
+        </p:nvCxnSpPr>
+        <p:spPr>
+          <a:xfrm flipH="1" flipV="1">
+            <a:off x="9533255" y="2441575"/>
+            <a:ext cx="7620" cy="1862455"/>
+          </a:xfrm>
+          <a:prstGeom prst="line">
+            <a:avLst/>
+          </a:prstGeom>
+        </p:spPr>
+        <p:style>
+          <a:lnRef idx="1">
+            <a:schemeClr val="accent1"/>
+          </a:lnRef>
+          <a:fillRef idx="0">
+            <a:schemeClr val="accent1"/>
+          </a:fillRef>
+          <a:effectRef idx="0">
+            <a:schemeClr val="accent1"/>
+          </a:effectRef>
+          <a:fontRef idx="minor">
+            <a:schemeClr val="tx1"/>
+          </a:fontRef>
+        </p:style>
+      </p:cxnSp>
+      <p:cxnSp>
+        <p:nvCxnSpPr>
+          <p:cNvPr id="41" name="Straight Arrow Connector 40"/>
+          <p:cNvCxnSpPr/>
+          <p:nvPr/>
+        </p:nvCxnSpPr>
+        <p:spPr>
+          <a:xfrm>
+            <a:off x="3224530" y="2183130"/>
+            <a:ext cx="0" cy="1050290"/>
+          </a:xfrm>
+          <a:prstGeom prst="straightConnector1">
+            <a:avLst/>
+          </a:prstGeom>
+          <a:ln>
+            <a:tailEnd type="arrow"/>
+          </a:ln>
+        </p:spPr>
+        <p:style>
+          <a:lnRef idx="1">
+            <a:schemeClr val="accent1"/>
+          </a:lnRef>
+          <a:fillRef idx="0">
+            <a:schemeClr val="accent1"/>
+          </a:fillRef>
+          <a:effectRef idx="0">
+            <a:schemeClr val="accent1"/>
+          </a:effectRef>
+          <a:fontRef idx="minor">
+            <a:schemeClr val="tx1"/>
+          </a:fontRef>
+        </p:style>
+      </p:cxnSp>
+      <p:sp>
+        <p:nvSpPr>
+          <p:cNvPr id="42" name="Rectangle 41"/>
+          <p:cNvSpPr/>
+          <p:nvPr/>
+        </p:nvSpPr>
+        <p:spPr>
+          <a:xfrm>
+            <a:off x="725805" y="2005330"/>
+            <a:ext cx="4168140" cy="301625"/>
+          </a:xfrm>
+          <a:prstGeom prst="rect">
+            <a:avLst/>
+          </a:prstGeom>
+        </p:spPr>
+        <p:style>
+          <a:lnRef idx="2">
+            <a:schemeClr val="accent3">
+              <a:shade val="50000"/>
+            </a:schemeClr>
+          </a:lnRef>
+          <a:fillRef idx="1">
+            <a:schemeClr val="accent3"/>
+          </a:fillRef>
+          <a:effectRef idx="0">
+            <a:schemeClr val="accent3"/>
+          </a:effectRef>
+          <a:fontRef idx="minor">
+            <a:schemeClr val="lt1"/>
+          </a:fontRef>
+        </p:style>
+        <p:txBody>
+          <a:bodyPr rtlCol="0" anchor="ctr"/>
+          <a:p>
+            <a:pPr algn="ctr"/>
+            <a:endParaRPr lang="en-US"/>
+          </a:p>
+        </p:txBody>
+      </p:sp>
     </p:spTree>
   </p:cSld>
   <p:clrMapOvr>

</xml_diff>